<commit_message>
Implemented IRepositoryPathProvider to separate discovery of repositories from usage or repos
</commit_message>
<xml_diff>
--- a/docs/ProjectDependencies.pptx
+++ b/docs/ProjectDependencies.pptx
@@ -104,6 +104,11 @@
       </a:defRPr>
     </a:lvl9pPr>
   </p:defaultTextStyle>
+  <p:extLst>
+    <p:ext uri="{EFAFB233-063F-42B5-8137-9DF3F51BA10A}">
+      <p15:sldGuideLst xmlns:p15="http://schemas.microsoft.com/office/powerpoint/2012/main"/>
+    </p:ext>
+  </p:extLst>
 </p:presentation>
 </file>
 
@@ -238,7 +243,7 @@
           <a:p>
             <a:fld id="{A9F95CB9-38AA-41F3-8A2A-C2F90382715B}" type="datetimeFigureOut">
               <a:rPr lang="en-US" smtClean="0"/>
-              <a:t>12/9/2015</a:t>
+              <a:t>12/10/2015</a:t>
             </a:fld>
             <a:endParaRPr lang="en-US"/>
           </a:p>
@@ -408,7 +413,7 @@
           <a:p>
             <a:fld id="{A9F95CB9-38AA-41F3-8A2A-C2F90382715B}" type="datetimeFigureOut">
               <a:rPr lang="en-US" smtClean="0"/>
-              <a:t>12/9/2015</a:t>
+              <a:t>12/10/2015</a:t>
             </a:fld>
             <a:endParaRPr lang="en-US"/>
           </a:p>
@@ -588,7 +593,7 @@
           <a:p>
             <a:fld id="{A9F95CB9-38AA-41F3-8A2A-C2F90382715B}" type="datetimeFigureOut">
               <a:rPr lang="en-US" smtClean="0"/>
-              <a:t>12/9/2015</a:t>
+              <a:t>12/10/2015</a:t>
             </a:fld>
             <a:endParaRPr lang="en-US"/>
           </a:p>
@@ -758,7 +763,7 @@
           <a:p>
             <a:fld id="{A9F95CB9-38AA-41F3-8A2A-C2F90382715B}" type="datetimeFigureOut">
               <a:rPr lang="en-US" smtClean="0"/>
-              <a:t>12/9/2015</a:t>
+              <a:t>12/10/2015</a:t>
             </a:fld>
             <a:endParaRPr lang="en-US"/>
           </a:p>
@@ -1004,7 +1009,7 @@
           <a:p>
             <a:fld id="{A9F95CB9-38AA-41F3-8A2A-C2F90382715B}" type="datetimeFigureOut">
               <a:rPr lang="en-US" smtClean="0"/>
-              <a:t>12/9/2015</a:t>
+              <a:t>12/10/2015</a:t>
             </a:fld>
             <a:endParaRPr lang="en-US"/>
           </a:p>
@@ -1236,7 +1241,7 @@
           <a:p>
             <a:fld id="{A9F95CB9-38AA-41F3-8A2A-C2F90382715B}" type="datetimeFigureOut">
               <a:rPr lang="en-US" smtClean="0"/>
-              <a:t>12/9/2015</a:t>
+              <a:t>12/10/2015</a:t>
             </a:fld>
             <a:endParaRPr lang="en-US"/>
           </a:p>
@@ -1603,7 +1608,7 @@
           <a:p>
             <a:fld id="{A9F95CB9-38AA-41F3-8A2A-C2F90382715B}" type="datetimeFigureOut">
               <a:rPr lang="en-US" smtClean="0"/>
-              <a:t>12/9/2015</a:t>
+              <a:t>12/10/2015</a:t>
             </a:fld>
             <a:endParaRPr lang="en-US"/>
           </a:p>
@@ -1721,7 +1726,7 @@
           <a:p>
             <a:fld id="{A9F95CB9-38AA-41F3-8A2A-C2F90382715B}" type="datetimeFigureOut">
               <a:rPr lang="en-US" smtClean="0"/>
-              <a:t>12/9/2015</a:t>
+              <a:t>12/10/2015</a:t>
             </a:fld>
             <a:endParaRPr lang="en-US"/>
           </a:p>
@@ -1816,7 +1821,7 @@
           <a:p>
             <a:fld id="{A9F95CB9-38AA-41F3-8A2A-C2F90382715B}" type="datetimeFigureOut">
               <a:rPr lang="en-US" smtClean="0"/>
-              <a:t>12/9/2015</a:t>
+              <a:t>12/10/2015</a:t>
             </a:fld>
             <a:endParaRPr lang="en-US"/>
           </a:p>
@@ -2093,7 +2098,7 @@
           <a:p>
             <a:fld id="{A9F95CB9-38AA-41F3-8A2A-C2F90382715B}" type="datetimeFigureOut">
               <a:rPr lang="en-US" smtClean="0"/>
-              <a:t>12/9/2015</a:t>
+              <a:t>12/10/2015</a:t>
             </a:fld>
             <a:endParaRPr lang="en-US"/>
           </a:p>
@@ -2346,7 +2351,7 @@
           <a:p>
             <a:fld id="{A9F95CB9-38AA-41F3-8A2A-C2F90382715B}" type="datetimeFigureOut">
               <a:rPr lang="en-US" smtClean="0"/>
-              <a:t>12/9/2015</a:t>
+              <a:t>12/10/2015</a:t>
             </a:fld>
             <a:endParaRPr lang="en-US"/>
           </a:p>
@@ -2559,7 +2564,7 @@
           <a:p>
             <a:fld id="{A9F95CB9-38AA-41F3-8A2A-C2F90382715B}" type="datetimeFigureOut">
               <a:rPr lang="en-US" smtClean="0"/>
-              <a:t>12/9/2015</a:t>
+              <a:t>12/10/2015</a:t>
             </a:fld>
             <a:endParaRPr lang="en-US"/>
           </a:p>
@@ -3721,8 +3726,8 @@
         </p:nvGrpSpPr>
         <p:grpSpPr>
           <a:xfrm>
-            <a:off x="4541661" y="3723028"/>
-            <a:ext cx="6545176" cy="705026"/>
+            <a:off x="4466472" y="3723028"/>
+            <a:ext cx="6620365" cy="705026"/>
             <a:chOff x="4487770" y="4426227"/>
             <a:chExt cx="6545176" cy="705026"/>
           </a:xfrm>

</xml_diff>

<commit_message>
Added ISynchronizationState interface and git based implementation
</commit_message>
<xml_diff>
--- a/docs/ProjectDependencies.pptx
+++ b/docs/ProjectDependencies.pptx
@@ -2977,7 +2977,7 @@
         </p:nvGrpSpPr>
         <p:grpSpPr>
           <a:xfrm>
-            <a:off x="1172582" y="1282885"/>
+            <a:off x="1172582" y="579496"/>
             <a:ext cx="10020021" cy="710558"/>
             <a:chOff x="1019172" y="1074142"/>
             <a:chExt cx="10013778" cy="710558"/>
@@ -3726,8 +3726,8 @@
         </p:nvGrpSpPr>
         <p:grpSpPr>
           <a:xfrm>
-            <a:off x="4466472" y="3723028"/>
-            <a:ext cx="6726128" cy="705026"/>
+            <a:off x="4237892" y="3723028"/>
+            <a:ext cx="6954708" cy="705026"/>
             <a:chOff x="4487770" y="4426227"/>
             <a:chExt cx="6545176" cy="705026"/>
           </a:xfrm>
@@ -3926,6 +3926,113 @@
               <a:r>
                 <a:rPr lang="en-US" dirty="0" err="1" smtClean="0"/>
                 <a:t>SyncTool.Synchronization</a:t>
+              </a:r>
+              <a:endParaRPr lang="en-US" dirty="0"/>
+            </a:p>
+          </p:txBody>
+        </p:sp>
+      </p:grpSp>
+      <p:grpSp>
+        <p:nvGrpSpPr>
+          <p:cNvPr id="38" name="Gruppieren 37"/>
+          <p:cNvGrpSpPr/>
+          <p:nvPr/>
+        </p:nvGrpSpPr>
+        <p:grpSpPr>
+          <a:xfrm>
+            <a:off x="4688489" y="1344717"/>
+            <a:ext cx="6504111" cy="708589"/>
+            <a:chOff x="6086473" y="2119698"/>
+            <a:chExt cx="4946477" cy="708589"/>
+          </a:xfrm>
+        </p:grpSpPr>
+        <p:sp>
+          <p:nvSpPr>
+            <p:cNvPr id="39" name="Abgerundetes Rechteck 38"/>
+            <p:cNvSpPr/>
+            <p:nvPr/>
+          </p:nvSpPr>
+          <p:spPr>
+            <a:xfrm>
+              <a:off x="6086474" y="2119698"/>
+              <a:ext cx="4946476" cy="252000"/>
+            </a:xfrm>
+            <a:prstGeom prst="roundRect">
+              <a:avLst/>
+            </a:prstGeom>
+            <a:solidFill>
+              <a:schemeClr val="accent1">
+                <a:alpha val="50000"/>
+              </a:schemeClr>
+            </a:solidFill>
+            <a:ln>
+              <a:noFill/>
+            </a:ln>
+          </p:spPr>
+          <p:style>
+            <a:lnRef idx="0">
+              <a:scrgbClr r="0" g="0" b="0"/>
+            </a:lnRef>
+            <a:fillRef idx="0">
+              <a:scrgbClr r="0" g="0" b="0"/>
+            </a:fillRef>
+            <a:effectRef idx="0">
+              <a:scrgbClr r="0" g="0" b="0"/>
+            </a:effectRef>
+            <a:fontRef idx="minor">
+              <a:schemeClr val="lt1"/>
+            </a:fontRef>
+          </p:style>
+          <p:txBody>
+            <a:bodyPr rtlCol="0" anchor="ctr"/>
+            <a:lstStyle/>
+            <a:p>
+              <a:pPr algn="ctr"/>
+              <a:r>
+                <a:rPr lang="en-US" sz="1400" dirty="0" err="1" smtClean="0"/>
+                <a:t>SyncTool.Synchronization.Git.Test</a:t>
+              </a:r>
+              <a:endParaRPr lang="en-US" sz="1400" dirty="0"/>
+            </a:p>
+          </p:txBody>
+        </p:sp>
+        <p:sp>
+          <p:nvSpPr>
+            <p:cNvPr id="40" name="Abgerundetes Rechteck 39"/>
+            <p:cNvSpPr/>
+            <p:nvPr/>
+          </p:nvSpPr>
+          <p:spPr>
+            <a:xfrm>
+              <a:off x="6086473" y="2396287"/>
+              <a:ext cx="4946476" cy="432000"/>
+            </a:xfrm>
+            <a:prstGeom prst="roundRect">
+              <a:avLst/>
+            </a:prstGeom>
+          </p:spPr>
+          <p:style>
+            <a:lnRef idx="0">
+              <a:schemeClr val="accent1"/>
+            </a:lnRef>
+            <a:fillRef idx="3">
+              <a:schemeClr val="accent1"/>
+            </a:fillRef>
+            <a:effectRef idx="3">
+              <a:schemeClr val="accent1"/>
+            </a:effectRef>
+            <a:fontRef idx="minor">
+              <a:schemeClr val="lt1"/>
+            </a:fontRef>
+          </p:style>
+          <p:txBody>
+            <a:bodyPr rtlCol="0" anchor="ctr"/>
+            <a:lstStyle/>
+            <a:p>
+              <a:pPr algn="ctr"/>
+              <a:r>
+                <a:rPr lang="en-US" dirty="0" err="1" smtClean="0"/>
+                <a:t>SyncTool.Synchronization.Git</a:t>
               </a:r>
               <a:endParaRPr lang="en-US" dirty="0"/>
             </a:p>

</xml_diff>

<commit_message>
Consolidated all git-specific assemblie into SyncTool.Git. The number of assemblies was getting out of hand...
</commit_message>
<xml_diff>
--- a/docs/ProjectDependencies.pptx
+++ b/docs/ProjectDependencies.pptx
@@ -2977,7 +2977,7 @@
         </p:nvGrpSpPr>
         <p:grpSpPr>
           <a:xfrm>
-            <a:off x="1172582" y="579496"/>
+            <a:off x="1172577" y="455948"/>
             <a:ext cx="10020021" cy="710558"/>
             <a:chOff x="1019172" y="1074142"/>
             <a:chExt cx="10013778" cy="710558"/>
@@ -3084,8 +3084,8 @@
         </p:nvGrpSpPr>
         <p:grpSpPr>
           <a:xfrm>
-            <a:off x="1172583" y="2119465"/>
-            <a:ext cx="3469755" cy="705150"/>
+            <a:off x="1135803" y="1292801"/>
+            <a:ext cx="10056792" cy="705150"/>
             <a:chOff x="1019171" y="2123137"/>
             <a:chExt cx="4981576" cy="705150"/>
           </a:xfrm>
@@ -3134,7 +3134,7 @@
               <a:pPr algn="ctr"/>
               <a:r>
                 <a:rPr lang="en-US" sz="1400" dirty="0" err="1" smtClean="0"/>
-                <a:t>SyncTool.Configuration.Git.Test</a:t>
+                <a:t>SyncTool.Git.Test</a:t>
               </a:r>
               <a:endParaRPr lang="en-US" sz="1400" dirty="0"/>
             </a:p>
@@ -3176,114 +3176,7 @@
               <a:pPr algn="ctr"/>
               <a:r>
                 <a:rPr lang="en-US" dirty="0" err="1" smtClean="0"/>
-                <a:t>SyncTool.Configuration.Git</a:t>
-              </a:r>
-              <a:endParaRPr lang="en-US" dirty="0"/>
-            </a:p>
-          </p:txBody>
-        </p:sp>
-      </p:grpSp>
-      <p:grpSp>
-        <p:nvGrpSpPr>
-          <p:cNvPr id="27" name="Gruppieren 26"/>
-          <p:cNvGrpSpPr/>
-          <p:nvPr/>
-        </p:nvGrpSpPr>
-        <p:grpSpPr>
-          <a:xfrm>
-            <a:off x="4688489" y="2119698"/>
-            <a:ext cx="3804874" cy="708589"/>
-            <a:chOff x="6086473" y="2119698"/>
-            <a:chExt cx="4946476" cy="708589"/>
-          </a:xfrm>
-        </p:grpSpPr>
-        <p:sp>
-          <p:nvSpPr>
-            <p:cNvPr id="18" name="Abgerundetes Rechteck 17"/>
-            <p:cNvSpPr/>
-            <p:nvPr/>
-          </p:nvSpPr>
-          <p:spPr>
-            <a:xfrm>
-              <a:off x="6086473" y="2119698"/>
-              <a:ext cx="4946476" cy="252000"/>
-            </a:xfrm>
-            <a:prstGeom prst="roundRect">
-              <a:avLst/>
-            </a:prstGeom>
-            <a:solidFill>
-              <a:schemeClr val="accent1">
-                <a:alpha val="50000"/>
-              </a:schemeClr>
-            </a:solidFill>
-            <a:ln>
-              <a:noFill/>
-            </a:ln>
-          </p:spPr>
-          <p:style>
-            <a:lnRef idx="0">
-              <a:scrgbClr r="0" g="0" b="0"/>
-            </a:lnRef>
-            <a:fillRef idx="0">
-              <a:scrgbClr r="0" g="0" b="0"/>
-            </a:fillRef>
-            <a:effectRef idx="0">
-              <a:scrgbClr r="0" g="0" b="0"/>
-            </a:effectRef>
-            <a:fontRef idx="minor">
-              <a:schemeClr val="lt1"/>
-            </a:fontRef>
-          </p:style>
-          <p:txBody>
-            <a:bodyPr rtlCol="0" anchor="ctr"/>
-            <a:lstStyle/>
-            <a:p>
-              <a:pPr algn="ctr"/>
-              <a:r>
-                <a:rPr lang="en-US" sz="1400" dirty="0" err="1" smtClean="0"/>
-                <a:t>SyncTool.FileSystem.Versioning.Git.Test</a:t>
-              </a:r>
-              <a:endParaRPr lang="en-US" sz="1400" dirty="0"/>
-            </a:p>
-          </p:txBody>
-        </p:sp>
-        <p:sp>
-          <p:nvSpPr>
-            <p:cNvPr id="21" name="Abgerundetes Rechteck 20"/>
-            <p:cNvSpPr/>
-            <p:nvPr/>
-          </p:nvSpPr>
-          <p:spPr>
-            <a:xfrm>
-              <a:off x="6086473" y="2396287"/>
-              <a:ext cx="4946476" cy="432000"/>
-            </a:xfrm>
-            <a:prstGeom prst="roundRect">
-              <a:avLst/>
-            </a:prstGeom>
-          </p:spPr>
-          <p:style>
-            <a:lnRef idx="0">
-              <a:schemeClr val="accent1"/>
-            </a:lnRef>
-            <a:fillRef idx="3">
-              <a:schemeClr val="accent1"/>
-            </a:fillRef>
-            <a:effectRef idx="3">
-              <a:schemeClr val="accent1"/>
-            </a:effectRef>
-            <a:fontRef idx="minor">
-              <a:schemeClr val="lt1"/>
-            </a:fontRef>
-          </p:style>
-          <p:txBody>
-            <a:bodyPr rtlCol="0" anchor="ctr"/>
-            <a:lstStyle/>
-            <a:p>
-              <a:pPr algn="ctr"/>
-              <a:r>
-                <a:rPr lang="en-US" dirty="0" err="1" smtClean="0"/>
-                <a:t>SyncTool.FileSystem.Versioning.Git</a:t>
+                <a:t>SyncTool.Git</a:t>
               </a:r>
               <a:endParaRPr lang="en-US" dirty="0"/>
             </a:p>
@@ -3298,7 +3191,7 @@
         </p:nvGrpSpPr>
         <p:grpSpPr>
           <a:xfrm>
-            <a:off x="1172582" y="2924561"/>
+            <a:off x="1135808" y="2117205"/>
             <a:ext cx="3003764" cy="707008"/>
             <a:chOff x="1019172" y="3461117"/>
             <a:chExt cx="3240002" cy="707008"/>
@@ -3405,8 +3298,8 @@
         </p:nvGrpSpPr>
         <p:grpSpPr>
           <a:xfrm>
-            <a:off x="7369090" y="2924561"/>
-            <a:ext cx="3823517" cy="707008"/>
+            <a:off x="4237892" y="2924561"/>
+            <a:ext cx="6954715" cy="707008"/>
             <a:chOff x="7586399" y="3106719"/>
             <a:chExt cx="3240000" cy="707008"/>
           </a:xfrm>
@@ -3498,113 +3391,6 @@
               <a:r>
                 <a:rPr lang="en-US" sz="1400" dirty="0" err="1" smtClean="0"/>
                 <a:t>SyncTool.FileSystem.Versioning.Test</a:t>
-              </a:r>
-              <a:endParaRPr lang="en-US" sz="1400" dirty="0"/>
-            </a:p>
-          </p:txBody>
-        </p:sp>
-      </p:grpSp>
-      <p:grpSp>
-        <p:nvGrpSpPr>
-          <p:cNvPr id="33" name="Gruppieren 32"/>
-          <p:cNvGrpSpPr/>
-          <p:nvPr/>
-        </p:nvGrpSpPr>
-        <p:grpSpPr>
-          <a:xfrm>
-            <a:off x="4237892" y="2925551"/>
-            <a:ext cx="3077309" cy="706290"/>
-            <a:chOff x="5319710" y="3162701"/>
-            <a:chExt cx="3240001" cy="706290"/>
-          </a:xfrm>
-        </p:grpSpPr>
-        <p:sp>
-          <p:nvSpPr>
-            <p:cNvPr id="17" name="Abgerundetes Rechteck 16"/>
-            <p:cNvSpPr/>
-            <p:nvPr/>
-          </p:nvSpPr>
-          <p:spPr>
-            <a:xfrm>
-              <a:off x="5319710" y="3436991"/>
-              <a:ext cx="3240001" cy="432000"/>
-            </a:xfrm>
-            <a:prstGeom prst="roundRect">
-              <a:avLst/>
-            </a:prstGeom>
-          </p:spPr>
-          <p:style>
-            <a:lnRef idx="0">
-              <a:schemeClr val="accent1"/>
-            </a:lnRef>
-            <a:fillRef idx="3">
-              <a:schemeClr val="accent1"/>
-            </a:fillRef>
-            <a:effectRef idx="3">
-              <a:schemeClr val="accent1"/>
-            </a:effectRef>
-            <a:fontRef idx="minor">
-              <a:schemeClr val="lt1"/>
-            </a:fontRef>
-          </p:style>
-          <p:txBody>
-            <a:bodyPr rtlCol="0" anchor="ctr"/>
-            <a:lstStyle/>
-            <a:p>
-              <a:pPr algn="ctr"/>
-              <a:r>
-                <a:rPr lang="en-US" dirty="0" err="1" smtClean="0"/>
-                <a:t>SyncTool.FileSystem.Git</a:t>
-              </a:r>
-              <a:endParaRPr lang="en-US" dirty="0"/>
-            </a:p>
-          </p:txBody>
-        </p:sp>
-        <p:sp>
-          <p:nvSpPr>
-            <p:cNvPr id="24" name="Abgerundetes Rechteck 23"/>
-            <p:cNvSpPr/>
-            <p:nvPr/>
-          </p:nvSpPr>
-          <p:spPr>
-            <a:xfrm>
-              <a:off x="5319710" y="3162701"/>
-              <a:ext cx="3240001" cy="252000"/>
-            </a:xfrm>
-            <a:prstGeom prst="roundRect">
-              <a:avLst/>
-            </a:prstGeom>
-            <a:solidFill>
-              <a:schemeClr val="accent1">
-                <a:alpha val="50000"/>
-              </a:schemeClr>
-            </a:solidFill>
-            <a:ln>
-              <a:noFill/>
-            </a:ln>
-          </p:spPr>
-          <p:style>
-            <a:lnRef idx="0">
-              <a:scrgbClr r="0" g="0" b="0"/>
-            </a:lnRef>
-            <a:fillRef idx="0">
-              <a:scrgbClr r="0" g="0" b="0"/>
-            </a:fillRef>
-            <a:effectRef idx="0">
-              <a:scrgbClr r="0" g="0" b="0"/>
-            </a:effectRef>
-            <a:fontRef idx="minor">
-              <a:schemeClr val="lt1"/>
-            </a:fontRef>
-          </p:style>
-          <p:txBody>
-            <a:bodyPr rtlCol="0" anchor="ctr"/>
-            <a:lstStyle/>
-            <a:p>
-              <a:pPr algn="ctr"/>
-              <a:r>
-                <a:rPr lang="en-US" sz="1400" dirty="0" err="1" smtClean="0"/>
-                <a:t>SyncTool.FileSystem.Git.Test</a:t>
               </a:r>
               <a:endParaRPr lang="en-US" sz="1400" dirty="0"/>
             </a:p>
@@ -3833,8 +3619,8 @@
         </p:nvGrpSpPr>
         <p:grpSpPr>
           <a:xfrm>
-            <a:off x="8557109" y="2115624"/>
-            <a:ext cx="2635499" cy="708589"/>
+            <a:off x="4237893" y="2115624"/>
+            <a:ext cx="6954716" cy="708589"/>
             <a:chOff x="6086473" y="2119698"/>
             <a:chExt cx="4946477" cy="708589"/>
           </a:xfrm>
@@ -3926,113 +3712,6 @@
               <a:r>
                 <a:rPr lang="en-US" dirty="0" err="1" smtClean="0"/>
                 <a:t>SyncTool.Synchronization</a:t>
-              </a:r>
-              <a:endParaRPr lang="en-US" dirty="0"/>
-            </a:p>
-          </p:txBody>
-        </p:sp>
-      </p:grpSp>
-      <p:grpSp>
-        <p:nvGrpSpPr>
-          <p:cNvPr id="38" name="Gruppieren 37"/>
-          <p:cNvGrpSpPr/>
-          <p:nvPr/>
-        </p:nvGrpSpPr>
-        <p:grpSpPr>
-          <a:xfrm>
-            <a:off x="4688489" y="1344717"/>
-            <a:ext cx="6504111" cy="708589"/>
-            <a:chOff x="6086473" y="2119698"/>
-            <a:chExt cx="4946477" cy="708589"/>
-          </a:xfrm>
-        </p:grpSpPr>
-        <p:sp>
-          <p:nvSpPr>
-            <p:cNvPr id="39" name="Abgerundetes Rechteck 38"/>
-            <p:cNvSpPr/>
-            <p:nvPr/>
-          </p:nvSpPr>
-          <p:spPr>
-            <a:xfrm>
-              <a:off x="6086474" y="2119698"/>
-              <a:ext cx="4946476" cy="252000"/>
-            </a:xfrm>
-            <a:prstGeom prst="roundRect">
-              <a:avLst/>
-            </a:prstGeom>
-            <a:solidFill>
-              <a:schemeClr val="accent1">
-                <a:alpha val="50000"/>
-              </a:schemeClr>
-            </a:solidFill>
-            <a:ln>
-              <a:noFill/>
-            </a:ln>
-          </p:spPr>
-          <p:style>
-            <a:lnRef idx="0">
-              <a:scrgbClr r="0" g="0" b="0"/>
-            </a:lnRef>
-            <a:fillRef idx="0">
-              <a:scrgbClr r="0" g="0" b="0"/>
-            </a:fillRef>
-            <a:effectRef idx="0">
-              <a:scrgbClr r="0" g="0" b="0"/>
-            </a:effectRef>
-            <a:fontRef idx="minor">
-              <a:schemeClr val="lt1"/>
-            </a:fontRef>
-          </p:style>
-          <p:txBody>
-            <a:bodyPr rtlCol="0" anchor="ctr"/>
-            <a:lstStyle/>
-            <a:p>
-              <a:pPr algn="ctr"/>
-              <a:r>
-                <a:rPr lang="en-US" sz="1400" dirty="0" err="1" smtClean="0"/>
-                <a:t>SyncTool.Synchronization.Git.Test</a:t>
-              </a:r>
-              <a:endParaRPr lang="en-US" sz="1400" dirty="0"/>
-            </a:p>
-          </p:txBody>
-        </p:sp>
-        <p:sp>
-          <p:nvSpPr>
-            <p:cNvPr id="40" name="Abgerundetes Rechteck 39"/>
-            <p:cNvSpPr/>
-            <p:nvPr/>
-          </p:nvSpPr>
-          <p:spPr>
-            <a:xfrm>
-              <a:off x="6086473" y="2396287"/>
-              <a:ext cx="4946476" cy="432000"/>
-            </a:xfrm>
-            <a:prstGeom prst="roundRect">
-              <a:avLst/>
-            </a:prstGeom>
-          </p:spPr>
-          <p:style>
-            <a:lnRef idx="0">
-              <a:schemeClr val="accent1"/>
-            </a:lnRef>
-            <a:fillRef idx="3">
-              <a:schemeClr val="accent1"/>
-            </a:fillRef>
-            <a:effectRef idx="3">
-              <a:schemeClr val="accent1"/>
-            </a:effectRef>
-            <a:fontRef idx="minor">
-              <a:schemeClr val="lt1"/>
-            </a:fontRef>
-          </p:style>
-          <p:txBody>
-            <a:bodyPr rtlCol="0" anchor="ctr"/>
-            <a:lstStyle/>
-            <a:p>
-              <a:pPr algn="ctr"/>
-              <a:r>
-                <a:rPr lang="en-US" dirty="0" err="1" smtClean="0"/>
-                <a:t>SyncTool.Synchronization.Git</a:t>
               </a:r>
               <a:endParaRPr lang="en-US" dirty="0"/>
             </a:p>

</xml_diff>

<commit_message>
Use simplified Visual Studio 2017 project file format
</commit_message>
<xml_diff>
--- a/docs/ProjectDependencies.pptx
+++ b/docs/ProjectDependencies.pptx
@@ -154,7 +154,7 @@
           </a:lstStyle>
           <a:p>
             <a:r>
-              <a:rPr lang="de-DE" smtClean="0"/>
+              <a:rPr lang="de-DE"/>
               <a:t>Titelmasterformat durch Klicken bearbeiten</a:t>
             </a:r>
             <a:endParaRPr lang="en-US"/>
@@ -219,7 +219,7 @@
           </a:lstStyle>
           <a:p>
             <a:r>
-              <a:rPr lang="de-DE" smtClean="0"/>
+              <a:rPr lang="de-DE"/>
               <a:t>Formatvorlage des Untertitelmasters durch Klicken bearbeiten</a:t>
             </a:r>
             <a:endParaRPr lang="en-US"/>
@@ -243,7 +243,7 @@
           <a:p>
             <a:fld id="{A9F95CB9-38AA-41F3-8A2A-C2F90382715B}" type="datetimeFigureOut">
               <a:rPr lang="en-US" smtClean="0"/>
-              <a:t>12/t/jjjj</a:t>
+              <a:t>3/30/2017</a:t>
             </a:fld>
             <a:endParaRPr lang="en-US"/>
           </a:p>
@@ -337,7 +337,7 @@
           <a:lstStyle/>
           <a:p>
             <a:r>
-              <a:rPr lang="de-DE" smtClean="0"/>
+              <a:rPr lang="de-DE"/>
               <a:t>Titelmasterformat durch Klicken bearbeiten</a:t>
             </a:r>
             <a:endParaRPr lang="en-US"/>
@@ -361,35 +361,35 @@
           <a:p>
             <a:pPr lvl="0"/>
             <a:r>
-              <a:rPr lang="de-DE" smtClean="0"/>
+              <a:rPr lang="de-DE"/>
               <a:t>Formatvorlagen des Textmasters bearbeiten</a:t>
             </a:r>
           </a:p>
           <a:p>
             <a:pPr lvl="1"/>
             <a:r>
-              <a:rPr lang="de-DE" smtClean="0"/>
+              <a:rPr lang="de-DE"/>
               <a:t>Zweite Ebene</a:t>
             </a:r>
           </a:p>
           <a:p>
             <a:pPr lvl="2"/>
             <a:r>
-              <a:rPr lang="de-DE" smtClean="0"/>
+              <a:rPr lang="de-DE"/>
               <a:t>Dritte Ebene</a:t>
             </a:r>
           </a:p>
           <a:p>
             <a:pPr lvl="3"/>
             <a:r>
-              <a:rPr lang="de-DE" smtClean="0"/>
+              <a:rPr lang="de-DE"/>
               <a:t>Vierte Ebene</a:t>
             </a:r>
           </a:p>
           <a:p>
             <a:pPr lvl="4"/>
             <a:r>
-              <a:rPr lang="de-DE" smtClean="0"/>
+              <a:rPr lang="de-DE"/>
               <a:t>Fünfte Ebene</a:t>
             </a:r>
             <a:endParaRPr lang="en-US"/>
@@ -413,7 +413,7 @@
           <a:p>
             <a:fld id="{A9F95CB9-38AA-41F3-8A2A-C2F90382715B}" type="datetimeFigureOut">
               <a:rPr lang="en-US" smtClean="0"/>
-              <a:t>12/t/jjjj</a:t>
+              <a:t>3/30/2017</a:t>
             </a:fld>
             <a:endParaRPr lang="en-US"/>
           </a:p>
@@ -512,7 +512,7 @@
           <a:lstStyle/>
           <a:p>
             <a:r>
-              <a:rPr lang="de-DE" smtClean="0"/>
+              <a:rPr lang="de-DE"/>
               <a:t>Titelmasterformat durch Klicken bearbeiten</a:t>
             </a:r>
             <a:endParaRPr lang="en-US"/>
@@ -541,35 +541,35 @@
           <a:p>
             <a:pPr lvl="0"/>
             <a:r>
-              <a:rPr lang="de-DE" smtClean="0"/>
+              <a:rPr lang="de-DE"/>
               <a:t>Formatvorlagen des Textmasters bearbeiten</a:t>
             </a:r>
           </a:p>
           <a:p>
             <a:pPr lvl="1"/>
             <a:r>
-              <a:rPr lang="de-DE" smtClean="0"/>
+              <a:rPr lang="de-DE"/>
               <a:t>Zweite Ebene</a:t>
             </a:r>
           </a:p>
           <a:p>
             <a:pPr lvl="2"/>
             <a:r>
-              <a:rPr lang="de-DE" smtClean="0"/>
+              <a:rPr lang="de-DE"/>
               <a:t>Dritte Ebene</a:t>
             </a:r>
           </a:p>
           <a:p>
             <a:pPr lvl="3"/>
             <a:r>
-              <a:rPr lang="de-DE" smtClean="0"/>
+              <a:rPr lang="de-DE"/>
               <a:t>Vierte Ebene</a:t>
             </a:r>
           </a:p>
           <a:p>
             <a:pPr lvl="4"/>
             <a:r>
-              <a:rPr lang="de-DE" smtClean="0"/>
+              <a:rPr lang="de-DE"/>
               <a:t>Fünfte Ebene</a:t>
             </a:r>
             <a:endParaRPr lang="en-US"/>
@@ -593,7 +593,7 @@
           <a:p>
             <a:fld id="{A9F95CB9-38AA-41F3-8A2A-C2F90382715B}" type="datetimeFigureOut">
               <a:rPr lang="en-US" smtClean="0"/>
-              <a:t>12/t/jjjj</a:t>
+              <a:t>3/30/2017</a:t>
             </a:fld>
             <a:endParaRPr lang="en-US"/>
           </a:p>
@@ -687,7 +687,7 @@
           <a:lstStyle/>
           <a:p>
             <a:r>
-              <a:rPr lang="de-DE" smtClean="0"/>
+              <a:rPr lang="de-DE"/>
               <a:t>Titelmasterformat durch Klicken bearbeiten</a:t>
             </a:r>
             <a:endParaRPr lang="en-US"/>
@@ -711,35 +711,35 @@
           <a:p>
             <a:pPr lvl="0"/>
             <a:r>
-              <a:rPr lang="de-DE" smtClean="0"/>
+              <a:rPr lang="de-DE"/>
               <a:t>Formatvorlagen des Textmasters bearbeiten</a:t>
             </a:r>
           </a:p>
           <a:p>
             <a:pPr lvl="1"/>
             <a:r>
-              <a:rPr lang="de-DE" smtClean="0"/>
+              <a:rPr lang="de-DE"/>
               <a:t>Zweite Ebene</a:t>
             </a:r>
           </a:p>
           <a:p>
             <a:pPr lvl="2"/>
             <a:r>
-              <a:rPr lang="de-DE" smtClean="0"/>
+              <a:rPr lang="de-DE"/>
               <a:t>Dritte Ebene</a:t>
             </a:r>
           </a:p>
           <a:p>
             <a:pPr lvl="3"/>
             <a:r>
-              <a:rPr lang="de-DE" smtClean="0"/>
+              <a:rPr lang="de-DE"/>
               <a:t>Vierte Ebene</a:t>
             </a:r>
           </a:p>
           <a:p>
             <a:pPr lvl="4"/>
             <a:r>
-              <a:rPr lang="de-DE" smtClean="0"/>
+              <a:rPr lang="de-DE"/>
               <a:t>Fünfte Ebene</a:t>
             </a:r>
             <a:endParaRPr lang="en-US"/>
@@ -763,7 +763,7 @@
           <a:p>
             <a:fld id="{A9F95CB9-38AA-41F3-8A2A-C2F90382715B}" type="datetimeFigureOut">
               <a:rPr lang="en-US" smtClean="0"/>
-              <a:t>12/t/jjjj</a:t>
+              <a:t>3/30/2017</a:t>
             </a:fld>
             <a:endParaRPr lang="en-US"/>
           </a:p>
@@ -866,7 +866,7 @@
           </a:lstStyle>
           <a:p>
             <a:r>
-              <a:rPr lang="de-DE" smtClean="0"/>
+              <a:rPr lang="de-DE"/>
               <a:t>Titelmasterformat durch Klicken bearbeiten</a:t>
             </a:r>
             <a:endParaRPr lang="en-US"/>
@@ -986,7 +986,7 @@
           <a:p>
             <a:pPr lvl="0"/>
             <a:r>
-              <a:rPr lang="de-DE" smtClean="0"/>
+              <a:rPr lang="de-DE"/>
               <a:t>Formatvorlagen des Textmasters bearbeiten</a:t>
             </a:r>
           </a:p>
@@ -1009,7 +1009,7 @@
           <a:p>
             <a:fld id="{A9F95CB9-38AA-41F3-8A2A-C2F90382715B}" type="datetimeFigureOut">
               <a:rPr lang="en-US" smtClean="0"/>
-              <a:t>12/t/jjjj</a:t>
+              <a:t>3/30/2017</a:t>
             </a:fld>
             <a:endParaRPr lang="en-US"/>
           </a:p>
@@ -1103,7 +1103,7 @@
           <a:lstStyle/>
           <a:p>
             <a:r>
-              <a:rPr lang="de-DE" smtClean="0"/>
+              <a:rPr lang="de-DE"/>
               <a:t>Titelmasterformat durch Klicken bearbeiten</a:t>
             </a:r>
             <a:endParaRPr lang="en-US"/>
@@ -1132,35 +1132,35 @@
           <a:p>
             <a:pPr lvl="0"/>
             <a:r>
-              <a:rPr lang="de-DE" smtClean="0"/>
+              <a:rPr lang="de-DE"/>
               <a:t>Formatvorlagen des Textmasters bearbeiten</a:t>
             </a:r>
           </a:p>
           <a:p>
             <a:pPr lvl="1"/>
             <a:r>
-              <a:rPr lang="de-DE" smtClean="0"/>
+              <a:rPr lang="de-DE"/>
               <a:t>Zweite Ebene</a:t>
             </a:r>
           </a:p>
           <a:p>
             <a:pPr lvl="2"/>
             <a:r>
-              <a:rPr lang="de-DE" smtClean="0"/>
+              <a:rPr lang="de-DE"/>
               <a:t>Dritte Ebene</a:t>
             </a:r>
           </a:p>
           <a:p>
             <a:pPr lvl="3"/>
             <a:r>
-              <a:rPr lang="de-DE" smtClean="0"/>
+              <a:rPr lang="de-DE"/>
               <a:t>Vierte Ebene</a:t>
             </a:r>
           </a:p>
           <a:p>
             <a:pPr lvl="4"/>
             <a:r>
-              <a:rPr lang="de-DE" smtClean="0"/>
+              <a:rPr lang="de-DE"/>
               <a:t>Fünfte Ebene</a:t>
             </a:r>
             <a:endParaRPr lang="en-US"/>
@@ -1189,35 +1189,35 @@
           <a:p>
             <a:pPr lvl="0"/>
             <a:r>
-              <a:rPr lang="de-DE" smtClean="0"/>
+              <a:rPr lang="de-DE"/>
               <a:t>Formatvorlagen des Textmasters bearbeiten</a:t>
             </a:r>
           </a:p>
           <a:p>
             <a:pPr lvl="1"/>
             <a:r>
-              <a:rPr lang="de-DE" smtClean="0"/>
+              <a:rPr lang="de-DE"/>
               <a:t>Zweite Ebene</a:t>
             </a:r>
           </a:p>
           <a:p>
             <a:pPr lvl="2"/>
             <a:r>
-              <a:rPr lang="de-DE" smtClean="0"/>
+              <a:rPr lang="de-DE"/>
               <a:t>Dritte Ebene</a:t>
             </a:r>
           </a:p>
           <a:p>
             <a:pPr lvl="3"/>
             <a:r>
-              <a:rPr lang="de-DE" smtClean="0"/>
+              <a:rPr lang="de-DE"/>
               <a:t>Vierte Ebene</a:t>
             </a:r>
           </a:p>
           <a:p>
             <a:pPr lvl="4"/>
             <a:r>
-              <a:rPr lang="de-DE" smtClean="0"/>
+              <a:rPr lang="de-DE"/>
               <a:t>Fünfte Ebene</a:t>
             </a:r>
             <a:endParaRPr lang="en-US"/>
@@ -1241,7 +1241,7 @@
           <a:p>
             <a:fld id="{A9F95CB9-38AA-41F3-8A2A-C2F90382715B}" type="datetimeFigureOut">
               <a:rPr lang="en-US" smtClean="0"/>
-              <a:t>12/t/jjjj</a:t>
+              <a:t>3/30/2017</a:t>
             </a:fld>
             <a:endParaRPr lang="en-US"/>
           </a:p>
@@ -1340,7 +1340,7 @@
           <a:lstStyle/>
           <a:p>
             <a:r>
-              <a:rPr lang="de-DE" smtClean="0"/>
+              <a:rPr lang="de-DE"/>
               <a:t>Titelmasterformat durch Klicken bearbeiten</a:t>
             </a:r>
             <a:endParaRPr lang="en-US"/>
@@ -1406,7 +1406,7 @@
           <a:p>
             <a:pPr lvl="0"/>
             <a:r>
-              <a:rPr lang="de-DE" smtClean="0"/>
+              <a:rPr lang="de-DE"/>
               <a:t>Formatvorlagen des Textmasters bearbeiten</a:t>
             </a:r>
           </a:p>
@@ -1434,35 +1434,35 @@
           <a:p>
             <a:pPr lvl="0"/>
             <a:r>
-              <a:rPr lang="de-DE" smtClean="0"/>
+              <a:rPr lang="de-DE"/>
               <a:t>Formatvorlagen des Textmasters bearbeiten</a:t>
             </a:r>
           </a:p>
           <a:p>
             <a:pPr lvl="1"/>
             <a:r>
-              <a:rPr lang="de-DE" smtClean="0"/>
+              <a:rPr lang="de-DE"/>
               <a:t>Zweite Ebene</a:t>
             </a:r>
           </a:p>
           <a:p>
             <a:pPr lvl="2"/>
             <a:r>
-              <a:rPr lang="de-DE" smtClean="0"/>
+              <a:rPr lang="de-DE"/>
               <a:t>Dritte Ebene</a:t>
             </a:r>
           </a:p>
           <a:p>
             <a:pPr lvl="3"/>
             <a:r>
-              <a:rPr lang="de-DE" smtClean="0"/>
+              <a:rPr lang="de-DE"/>
               <a:t>Vierte Ebene</a:t>
             </a:r>
           </a:p>
           <a:p>
             <a:pPr lvl="4"/>
             <a:r>
-              <a:rPr lang="de-DE" smtClean="0"/>
+              <a:rPr lang="de-DE"/>
               <a:t>Fünfte Ebene</a:t>
             </a:r>
             <a:endParaRPr lang="en-US"/>
@@ -1528,7 +1528,7 @@
           <a:p>
             <a:pPr lvl="0"/>
             <a:r>
-              <a:rPr lang="de-DE" smtClean="0"/>
+              <a:rPr lang="de-DE"/>
               <a:t>Formatvorlagen des Textmasters bearbeiten</a:t>
             </a:r>
           </a:p>
@@ -1556,35 +1556,35 @@
           <a:p>
             <a:pPr lvl="0"/>
             <a:r>
-              <a:rPr lang="de-DE" smtClean="0"/>
+              <a:rPr lang="de-DE"/>
               <a:t>Formatvorlagen des Textmasters bearbeiten</a:t>
             </a:r>
           </a:p>
           <a:p>
             <a:pPr lvl="1"/>
             <a:r>
-              <a:rPr lang="de-DE" smtClean="0"/>
+              <a:rPr lang="de-DE"/>
               <a:t>Zweite Ebene</a:t>
             </a:r>
           </a:p>
           <a:p>
             <a:pPr lvl="2"/>
             <a:r>
-              <a:rPr lang="de-DE" smtClean="0"/>
+              <a:rPr lang="de-DE"/>
               <a:t>Dritte Ebene</a:t>
             </a:r>
           </a:p>
           <a:p>
             <a:pPr lvl="3"/>
             <a:r>
-              <a:rPr lang="de-DE" smtClean="0"/>
+              <a:rPr lang="de-DE"/>
               <a:t>Vierte Ebene</a:t>
             </a:r>
           </a:p>
           <a:p>
             <a:pPr lvl="4"/>
             <a:r>
-              <a:rPr lang="de-DE" smtClean="0"/>
+              <a:rPr lang="de-DE"/>
               <a:t>Fünfte Ebene</a:t>
             </a:r>
             <a:endParaRPr lang="en-US"/>
@@ -1608,7 +1608,7 @@
           <a:p>
             <a:fld id="{A9F95CB9-38AA-41F3-8A2A-C2F90382715B}" type="datetimeFigureOut">
               <a:rPr lang="en-US" smtClean="0"/>
-              <a:t>12/t/jjjj</a:t>
+              <a:t>3/30/2017</a:t>
             </a:fld>
             <a:endParaRPr lang="en-US"/>
           </a:p>
@@ -1702,7 +1702,7 @@
           <a:lstStyle/>
           <a:p>
             <a:r>
-              <a:rPr lang="de-DE" smtClean="0"/>
+              <a:rPr lang="de-DE"/>
               <a:t>Titelmasterformat durch Klicken bearbeiten</a:t>
             </a:r>
             <a:endParaRPr lang="en-US"/>
@@ -1726,7 +1726,7 @@
           <a:p>
             <a:fld id="{A9F95CB9-38AA-41F3-8A2A-C2F90382715B}" type="datetimeFigureOut">
               <a:rPr lang="en-US" smtClean="0"/>
-              <a:t>12/t/jjjj</a:t>
+              <a:t>3/30/2017</a:t>
             </a:fld>
             <a:endParaRPr lang="en-US"/>
           </a:p>
@@ -1821,7 +1821,7 @@
           <a:p>
             <a:fld id="{A9F95CB9-38AA-41F3-8A2A-C2F90382715B}" type="datetimeFigureOut">
               <a:rPr lang="en-US" smtClean="0"/>
-              <a:t>12/t/jjjj</a:t>
+              <a:t>3/30/2017</a:t>
             </a:fld>
             <a:endParaRPr lang="en-US"/>
           </a:p>
@@ -1924,7 +1924,7 @@
           </a:lstStyle>
           <a:p>
             <a:r>
-              <a:rPr lang="de-DE" smtClean="0"/>
+              <a:rPr lang="de-DE"/>
               <a:t>Titelmasterformat durch Klicken bearbeiten</a:t>
             </a:r>
             <a:endParaRPr lang="en-US"/>
@@ -1981,35 +1981,35 @@
           <a:p>
             <a:pPr lvl="0"/>
             <a:r>
-              <a:rPr lang="de-DE" smtClean="0"/>
+              <a:rPr lang="de-DE"/>
               <a:t>Formatvorlagen des Textmasters bearbeiten</a:t>
             </a:r>
           </a:p>
           <a:p>
             <a:pPr lvl="1"/>
             <a:r>
-              <a:rPr lang="de-DE" smtClean="0"/>
+              <a:rPr lang="de-DE"/>
               <a:t>Zweite Ebene</a:t>
             </a:r>
           </a:p>
           <a:p>
             <a:pPr lvl="2"/>
             <a:r>
-              <a:rPr lang="de-DE" smtClean="0"/>
+              <a:rPr lang="de-DE"/>
               <a:t>Dritte Ebene</a:t>
             </a:r>
           </a:p>
           <a:p>
             <a:pPr lvl="3"/>
             <a:r>
-              <a:rPr lang="de-DE" smtClean="0"/>
+              <a:rPr lang="de-DE"/>
               <a:t>Vierte Ebene</a:t>
             </a:r>
           </a:p>
           <a:p>
             <a:pPr lvl="4"/>
             <a:r>
-              <a:rPr lang="de-DE" smtClean="0"/>
+              <a:rPr lang="de-DE"/>
               <a:t>Fünfte Ebene</a:t>
             </a:r>
             <a:endParaRPr lang="en-US"/>
@@ -2075,7 +2075,7 @@
           <a:p>
             <a:pPr lvl="0"/>
             <a:r>
-              <a:rPr lang="de-DE" smtClean="0"/>
+              <a:rPr lang="de-DE"/>
               <a:t>Formatvorlagen des Textmasters bearbeiten</a:t>
             </a:r>
           </a:p>
@@ -2098,7 +2098,7 @@
           <a:p>
             <a:fld id="{A9F95CB9-38AA-41F3-8A2A-C2F90382715B}" type="datetimeFigureOut">
               <a:rPr lang="en-US" smtClean="0"/>
-              <a:t>12/t/jjjj</a:t>
+              <a:t>3/30/2017</a:t>
             </a:fld>
             <a:endParaRPr lang="en-US"/>
           </a:p>
@@ -2201,7 +2201,7 @@
           </a:lstStyle>
           <a:p>
             <a:r>
-              <a:rPr lang="de-DE" smtClean="0"/>
+              <a:rPr lang="de-DE"/>
               <a:t>Titelmasterformat durch Klicken bearbeiten</a:t>
             </a:r>
             <a:endParaRPr lang="en-US"/>
@@ -2328,7 +2328,7 @@
           <a:p>
             <a:pPr lvl="0"/>
             <a:r>
-              <a:rPr lang="de-DE" smtClean="0"/>
+              <a:rPr lang="de-DE"/>
               <a:t>Formatvorlagen des Textmasters bearbeiten</a:t>
             </a:r>
           </a:p>
@@ -2351,7 +2351,7 @@
           <a:p>
             <a:fld id="{A9F95CB9-38AA-41F3-8A2A-C2F90382715B}" type="datetimeFigureOut">
               <a:rPr lang="en-US" smtClean="0"/>
-              <a:t>12/t/jjjj</a:t>
+              <a:t>3/30/2017</a:t>
             </a:fld>
             <a:endParaRPr lang="en-US"/>
           </a:p>
@@ -2460,7 +2460,7 @@
           <a:lstStyle/>
           <a:p>
             <a:r>
-              <a:rPr lang="de-DE" smtClean="0"/>
+              <a:rPr lang="de-DE"/>
               <a:t>Titelmasterformat durch Klicken bearbeiten</a:t>
             </a:r>
             <a:endParaRPr lang="en-US"/>
@@ -2494,35 +2494,35 @@
           <a:p>
             <a:pPr lvl="0"/>
             <a:r>
-              <a:rPr lang="de-DE" smtClean="0"/>
+              <a:rPr lang="de-DE"/>
               <a:t>Formatvorlagen des Textmasters bearbeiten</a:t>
             </a:r>
           </a:p>
           <a:p>
             <a:pPr lvl="1"/>
             <a:r>
-              <a:rPr lang="de-DE" smtClean="0"/>
+              <a:rPr lang="de-DE"/>
               <a:t>Zweite Ebene</a:t>
             </a:r>
           </a:p>
           <a:p>
             <a:pPr lvl="2"/>
             <a:r>
-              <a:rPr lang="de-DE" smtClean="0"/>
+              <a:rPr lang="de-DE"/>
               <a:t>Dritte Ebene</a:t>
             </a:r>
           </a:p>
           <a:p>
             <a:pPr lvl="3"/>
             <a:r>
-              <a:rPr lang="de-DE" smtClean="0"/>
+              <a:rPr lang="de-DE"/>
               <a:t>Vierte Ebene</a:t>
             </a:r>
           </a:p>
           <a:p>
             <a:pPr lvl="4"/>
             <a:r>
-              <a:rPr lang="de-DE" smtClean="0"/>
+              <a:rPr lang="de-DE"/>
               <a:t>Fünfte Ebene</a:t>
             </a:r>
             <a:endParaRPr lang="en-US"/>
@@ -2564,7 +2564,7 @@
           <a:p>
             <a:fld id="{A9F95CB9-38AA-41F3-8A2A-C2F90382715B}" type="datetimeFigureOut">
               <a:rPr lang="en-US" smtClean="0"/>
-              <a:t>12/t/jjjj</a:t>
+              <a:t>3/30/2017</a:t>
             </a:fld>
             <a:endParaRPr lang="en-US"/>
           </a:p>
@@ -3018,7 +3018,7 @@
             <a:p>
               <a:pPr algn="ctr"/>
               <a:r>
-                <a:rPr lang="en-US" dirty="0" err="1" smtClean="0"/>
+                <a:rPr lang="en-US" dirty="0" err="1"/>
                 <a:t>SyncTool</a:t>
               </a:r>
               <a:endParaRPr lang="en-US" dirty="0"/>
@@ -3068,7 +3068,7 @@
             <a:p>
               <a:pPr algn="ctr"/>
               <a:r>
-                <a:rPr lang="en-US" sz="1400" dirty="0" err="1" smtClean="0"/>
+                <a:rPr lang="en-US" sz="1400" dirty="0" err="1"/>
                 <a:t>SyncTool.Test</a:t>
               </a:r>
               <a:endParaRPr lang="en-US" sz="1400" dirty="0"/>
@@ -3133,7 +3133,7 @@
             <a:p>
               <a:pPr algn="ctr"/>
               <a:r>
-                <a:rPr lang="en-US" sz="1400" dirty="0" err="1" smtClean="0"/>
+                <a:rPr lang="en-US" sz="1400" dirty="0" err="1"/>
                 <a:t>SyncTool.Git.Test</a:t>
               </a:r>
               <a:endParaRPr lang="en-US" sz="1400" dirty="0"/>
@@ -3175,7 +3175,7 @@
             <a:p>
               <a:pPr algn="ctr"/>
               <a:r>
-                <a:rPr lang="en-US" dirty="0" err="1" smtClean="0"/>
+                <a:rPr lang="en-US" dirty="0" err="1"/>
                 <a:t>SyncTool.Git</a:t>
               </a:r>
               <a:endParaRPr lang="en-US" dirty="0"/>
@@ -3191,7 +3191,7 @@
         </p:nvGrpSpPr>
         <p:grpSpPr>
           <a:xfrm>
-            <a:off x="1135808" y="2117205"/>
+            <a:off x="1172577" y="2924561"/>
             <a:ext cx="3003764" cy="707008"/>
             <a:chOff x="1019172" y="3461117"/>
             <a:chExt cx="3240002" cy="707008"/>
@@ -3232,7 +3232,7 @@
             <a:p>
               <a:pPr algn="ctr"/>
               <a:r>
-                <a:rPr lang="en-US" dirty="0" err="1" smtClean="0"/>
+                <a:rPr lang="en-US" dirty="0" err="1"/>
                 <a:t>SyncTool.Configuration</a:t>
               </a:r>
               <a:endParaRPr lang="en-US" dirty="0"/>
@@ -3282,7 +3282,7 @@
             <a:p>
               <a:pPr algn="ctr"/>
               <a:r>
-                <a:rPr lang="en-US" sz="1400" dirty="0" err="1" smtClean="0"/>
+                <a:rPr lang="en-US" sz="1400" dirty="0" err="1"/>
                 <a:t>SyncTool.Configuration.Test</a:t>
               </a:r>
               <a:endParaRPr lang="en-US" sz="1400" dirty="0"/>
@@ -3339,7 +3339,7 @@
             <a:p>
               <a:pPr algn="ctr"/>
               <a:r>
-                <a:rPr lang="en-US" dirty="0" err="1" smtClean="0"/>
+                <a:rPr lang="en-US" dirty="0" err="1"/>
                 <a:t>SyncTool.FileSystem.Versioning</a:t>
               </a:r>
               <a:endParaRPr lang="en-US" dirty="0"/>
@@ -3389,7 +3389,7 @@
             <a:p>
               <a:pPr algn="ctr"/>
               <a:r>
-                <a:rPr lang="en-US" sz="1400" dirty="0" err="1" smtClean="0"/>
+                <a:rPr lang="en-US" sz="1400" dirty="0" err="1"/>
                 <a:t>SyncTool.FileSystem.Versioning.Test</a:t>
               </a:r>
               <a:endParaRPr lang="en-US" sz="1400" dirty="0"/>
@@ -3446,7 +3446,7 @@
             <a:p>
               <a:pPr algn="ctr"/>
               <a:r>
-                <a:rPr lang="en-US" smtClean="0"/>
+                <a:rPr lang="en-US"/>
                 <a:t>SyncTool.Common</a:t>
               </a:r>
               <a:endParaRPr lang="en-US" dirty="0"/>
@@ -3496,7 +3496,7 @@
             <a:p>
               <a:pPr algn="ctr"/>
               <a:r>
-                <a:rPr lang="en-US" sz="1400" dirty="0" err="1" smtClean="0"/>
+                <a:rPr lang="en-US" sz="1400" dirty="0" err="1"/>
                 <a:t>SyncTool.Common.Test</a:t>
               </a:r>
               <a:endParaRPr lang="en-US" sz="1400" dirty="0"/>
@@ -3553,7 +3553,7 @@
             <a:p>
               <a:pPr algn="ctr"/>
               <a:r>
-                <a:rPr lang="en-US" dirty="0" err="1" smtClean="0"/>
+                <a:rPr lang="en-US" dirty="0" err="1"/>
                 <a:t>SyncTool.FileSystem</a:t>
               </a:r>
               <a:endParaRPr lang="en-US" dirty="0"/>
@@ -3603,7 +3603,7 @@
             <a:p>
               <a:pPr algn="ctr"/>
               <a:r>
-                <a:rPr lang="en-US" sz="1400" dirty="0" err="1" smtClean="0"/>
+                <a:rPr lang="en-US" sz="1400" dirty="0" err="1"/>
                 <a:t>SyncTool.FileSystem.Test</a:t>
               </a:r>
               <a:endParaRPr lang="en-US" sz="1400" dirty="0"/>
@@ -3619,8 +3619,8 @@
         </p:nvGrpSpPr>
         <p:grpSpPr>
           <a:xfrm>
-            <a:off x="4237893" y="2115624"/>
-            <a:ext cx="6954716" cy="708589"/>
+            <a:off x="1172577" y="2115624"/>
+            <a:ext cx="10020032" cy="708589"/>
             <a:chOff x="6086473" y="2119698"/>
             <a:chExt cx="4946477" cy="708589"/>
           </a:xfrm>
@@ -3668,7 +3668,7 @@
             <a:p>
               <a:pPr algn="ctr"/>
               <a:r>
-                <a:rPr lang="en-US" sz="1400" dirty="0" err="1" smtClean="0"/>
+                <a:rPr lang="en-US" sz="1400" dirty="0" err="1"/>
                 <a:t>SyncTool.Synchronization.Test</a:t>
               </a:r>
               <a:endParaRPr lang="en-US" sz="1400" dirty="0"/>
@@ -3710,7 +3710,7 @@
             <a:p>
               <a:pPr algn="ctr"/>
               <a:r>
-                <a:rPr lang="en-US" dirty="0" err="1" smtClean="0"/>
+                <a:rPr lang="en-US" dirty="0" err="1"/>
                 <a:t>SyncTool.Synchronization</a:t>
               </a:r>
               <a:endParaRPr lang="en-US" dirty="0"/>

</xml_diff>